<commit_message>
update plots, change condition names
</commit_message>
<xml_diff>
--- a/analysis/manuscript_files/figure-1a.pptx
+++ b/analysis/manuscript_files/figure-1a.pptx
@@ -8,7 +8,7 @@
     <p:notesMasterId r:id="rId3"/>
   </p:notesMasterIdLst>
   <p:sldIdLst>
-    <p:sldId id="256" r:id="rId2"/>
+    <p:sldId id="257" r:id="rId2"/>
   </p:sldIdLst>
   <p:sldSz cx="7199313" cy="3600450"/>
   <p:notesSz cx="6858000" cy="9144000"/>
@@ -197,7 +197,7 @@
           <a:p>
             <a:fld id="{6FE0F7CC-7061-5049-9DDB-E208C13D259A}" type="datetimeFigureOut">
               <a:rPr lang="en-US" smtClean="0"/>
-              <a:t>10/15/20</a:t>
+              <a:t>10/16/20</a:t>
             </a:fld>
             <a:endParaRPr lang="en-US"/>
           </a:p>
@@ -492,12 +492,7 @@
             <p:ph type="sldImg"/>
           </p:nvPr>
         </p:nvSpPr>
-        <p:spPr>
-          <a:xfrm>
-            <a:off x="344488" y="1143000"/>
-            <a:ext cx="6169025" cy="3086100"/>
-          </a:xfrm>
-        </p:spPr>
+        <p:spPr/>
       </p:sp>
       <p:sp>
         <p:nvSpPr>
@@ -544,7 +539,7 @@
     </p:spTree>
     <p:extLst>
       <p:ext uri="{BB962C8B-B14F-4D97-AF65-F5344CB8AC3E}">
-        <p14:creationId xmlns:p14="http://schemas.microsoft.com/office/powerpoint/2010/main" val="2174646496"/>
+        <p14:creationId xmlns:p14="http://schemas.microsoft.com/office/powerpoint/2010/main" val="1234271334"/>
       </p:ext>
     </p:extLst>
   </p:cSld>
@@ -685,7 +680,7 @@
           <a:p>
             <a:fld id="{1C407B86-2FEA-814D-8159-D22E2797FD65}" type="datetimeFigureOut">
               <a:rPr lang="en-US" smtClean="0"/>
-              <a:t>10/15/20</a:t>
+              <a:t>10/16/20</a:t>
             </a:fld>
             <a:endParaRPr lang="en-US"/>
           </a:p>
@@ -855,7 +850,7 @@
           <a:p>
             <a:fld id="{1C407B86-2FEA-814D-8159-D22E2797FD65}" type="datetimeFigureOut">
               <a:rPr lang="en-US" smtClean="0"/>
-              <a:t>10/15/20</a:t>
+              <a:t>10/16/20</a:t>
             </a:fld>
             <a:endParaRPr lang="en-US"/>
           </a:p>
@@ -1035,7 +1030,7 @@
           <a:p>
             <a:fld id="{1C407B86-2FEA-814D-8159-D22E2797FD65}" type="datetimeFigureOut">
               <a:rPr lang="en-US" smtClean="0"/>
-              <a:t>10/15/20</a:t>
+              <a:t>10/16/20</a:t>
             </a:fld>
             <a:endParaRPr lang="en-US"/>
           </a:p>
@@ -1205,7 +1200,7 @@
           <a:p>
             <a:fld id="{1C407B86-2FEA-814D-8159-D22E2797FD65}" type="datetimeFigureOut">
               <a:rPr lang="en-US" smtClean="0"/>
-              <a:t>10/15/20</a:t>
+              <a:t>10/16/20</a:t>
             </a:fld>
             <a:endParaRPr lang="en-US"/>
           </a:p>
@@ -1451,7 +1446,7 @@
           <a:p>
             <a:fld id="{1C407B86-2FEA-814D-8159-D22E2797FD65}" type="datetimeFigureOut">
               <a:rPr lang="en-US" smtClean="0"/>
-              <a:t>10/15/20</a:t>
+              <a:t>10/16/20</a:t>
             </a:fld>
             <a:endParaRPr lang="en-US"/>
           </a:p>
@@ -1683,7 +1678,7 @@
           <a:p>
             <a:fld id="{1C407B86-2FEA-814D-8159-D22E2797FD65}" type="datetimeFigureOut">
               <a:rPr lang="en-US" smtClean="0"/>
-              <a:t>10/15/20</a:t>
+              <a:t>10/16/20</a:t>
             </a:fld>
             <a:endParaRPr lang="en-US"/>
           </a:p>
@@ -2050,7 +2045,7 @@
           <a:p>
             <a:fld id="{1C407B86-2FEA-814D-8159-D22E2797FD65}" type="datetimeFigureOut">
               <a:rPr lang="en-US" smtClean="0"/>
-              <a:t>10/15/20</a:t>
+              <a:t>10/16/20</a:t>
             </a:fld>
             <a:endParaRPr lang="en-US"/>
           </a:p>
@@ -2168,7 +2163,7 @@
           <a:p>
             <a:fld id="{1C407B86-2FEA-814D-8159-D22E2797FD65}" type="datetimeFigureOut">
               <a:rPr lang="en-US" smtClean="0"/>
-              <a:t>10/15/20</a:t>
+              <a:t>10/16/20</a:t>
             </a:fld>
             <a:endParaRPr lang="en-US"/>
           </a:p>
@@ -2263,7 +2258,7 @@
           <a:p>
             <a:fld id="{1C407B86-2FEA-814D-8159-D22E2797FD65}" type="datetimeFigureOut">
               <a:rPr lang="en-US" smtClean="0"/>
-              <a:t>10/15/20</a:t>
+              <a:t>10/16/20</a:t>
             </a:fld>
             <a:endParaRPr lang="en-US"/>
           </a:p>
@@ -2540,7 +2535,7 @@
           <a:p>
             <a:fld id="{1C407B86-2FEA-814D-8159-D22E2797FD65}" type="datetimeFigureOut">
               <a:rPr lang="en-US" smtClean="0"/>
-              <a:t>10/15/20</a:t>
+              <a:t>10/16/20</a:t>
             </a:fld>
             <a:endParaRPr lang="en-US"/>
           </a:p>
@@ -2797,7 +2792,7 @@
           <a:p>
             <a:fld id="{1C407B86-2FEA-814D-8159-D22E2797FD65}" type="datetimeFigureOut">
               <a:rPr lang="en-US" smtClean="0"/>
-              <a:t>10/15/20</a:t>
+              <a:t>10/16/20</a:t>
             </a:fld>
             <a:endParaRPr lang="en-US"/>
           </a:p>
@@ -3010,7 +3005,7 @@
           <a:p>
             <a:fld id="{1C407B86-2FEA-814D-8159-D22E2797FD65}" type="datetimeFigureOut">
               <a:rPr lang="en-US" smtClean="0"/>
-              <a:t>10/15/20</a:t>
+              <a:t>10/16/20</a:t>
             </a:fld>
             <a:endParaRPr lang="en-US"/>
           </a:p>
@@ -3417,10 +3412,10 @@
       </p:grpSpPr>
       <p:grpSp>
         <p:nvGrpSpPr>
-          <p:cNvPr id="111" name="Group 110">
+          <p:cNvPr id="5" name="Group 4">
             <a:extLst>
               <a:ext uri="{FF2B5EF4-FFF2-40B4-BE49-F238E27FC236}">
-                <a16:creationId xmlns:a16="http://schemas.microsoft.com/office/drawing/2014/main" id="{02C98499-3FB3-7D4C-8DF2-8EFB67722A64}"/>
+                <a16:creationId xmlns:a16="http://schemas.microsoft.com/office/drawing/2014/main" id="{0C15E3A9-45EC-DC49-B4FA-BAAD5DA36678}"/>
               </a:ext>
             </a:extLst>
           </p:cNvPr>
@@ -3429,7 +3424,7 @@
         </p:nvGrpSpPr>
         <p:grpSpPr>
           <a:xfrm>
-            <a:off x="513340" y="2265460"/>
+            <a:off x="487886" y="2281672"/>
             <a:ext cx="1272766" cy="1185927"/>
             <a:chOff x="656272" y="1774980"/>
             <a:chExt cx="1107216" cy="1031673"/>
@@ -3437,10 +3432,10 @@
         </p:grpSpPr>
         <p:sp>
           <p:nvSpPr>
-            <p:cNvPr id="99" name="Rectangle 98">
+            <p:cNvPr id="6" name="Rectangle 5">
               <a:extLst>
                 <a:ext uri="{FF2B5EF4-FFF2-40B4-BE49-F238E27FC236}">
-                  <a16:creationId xmlns:a16="http://schemas.microsoft.com/office/drawing/2014/main" id="{42D9A325-4624-F941-B8B6-F4E4D4DC2B50}"/>
+                  <a16:creationId xmlns:a16="http://schemas.microsoft.com/office/drawing/2014/main" id="{D86A46F0-ABE8-7242-96D0-81F85BDCCC49}"/>
                 </a:ext>
               </a:extLst>
             </p:cNvPr>
@@ -3499,10 +3494,10 @@
         </p:sp>
         <p:sp>
           <p:nvSpPr>
-            <p:cNvPr id="100" name="Rectangle 99">
+            <p:cNvPr id="7" name="Rectangle 6">
               <a:extLst>
                 <a:ext uri="{FF2B5EF4-FFF2-40B4-BE49-F238E27FC236}">
-                  <a16:creationId xmlns:a16="http://schemas.microsoft.com/office/drawing/2014/main" id="{4F9AB6CB-C600-9340-AFD1-FB6FEA7F42CF}"/>
+                  <a16:creationId xmlns:a16="http://schemas.microsoft.com/office/drawing/2014/main" id="{E1BAF644-12EA-E74F-B207-3B7D36BA07BE}"/>
                 </a:ext>
               </a:extLst>
             </p:cNvPr>
@@ -3553,10 +3548,10 @@
         </p:sp>
         <p:pic>
           <p:nvPicPr>
-            <p:cNvPr id="101" name="Picture 100">
+            <p:cNvPr id="8" name="Picture 7">
               <a:extLst>
                 <a:ext uri="{FF2B5EF4-FFF2-40B4-BE49-F238E27FC236}">
-                  <a16:creationId xmlns:a16="http://schemas.microsoft.com/office/drawing/2014/main" id="{2AB7294F-FA33-C540-A50D-8635C622068B}"/>
+                  <a16:creationId xmlns:a16="http://schemas.microsoft.com/office/drawing/2014/main" id="{AE606C7E-7069-864C-BEB6-68FB7B328F48}"/>
                 </a:ext>
               </a:extLst>
             </p:cNvPr>
@@ -3582,10 +3577,10 @@
         </p:pic>
         <p:sp>
           <p:nvSpPr>
-            <p:cNvPr id="102" name="TextBox 101">
+            <p:cNvPr id="9" name="TextBox 8">
               <a:extLst>
                 <a:ext uri="{FF2B5EF4-FFF2-40B4-BE49-F238E27FC236}">
-                  <a16:creationId xmlns:a16="http://schemas.microsoft.com/office/drawing/2014/main" id="{D5A34425-5F7B-E742-AC7C-5729506F819C}"/>
+                  <a16:creationId xmlns:a16="http://schemas.microsoft.com/office/drawing/2014/main" id="{EB588319-464C-2743-9523-50A8AEBDACF1}"/>
                 </a:ext>
               </a:extLst>
             </p:cNvPr>
@@ -3620,10 +3615,10 @@
         </p:sp>
         <p:sp>
           <p:nvSpPr>
-            <p:cNvPr id="103" name="TextBox 102">
+            <p:cNvPr id="10" name="TextBox 9">
               <a:extLst>
                 <a:ext uri="{FF2B5EF4-FFF2-40B4-BE49-F238E27FC236}">
-                  <a16:creationId xmlns:a16="http://schemas.microsoft.com/office/drawing/2014/main" id="{65D92006-0CDA-9A4B-A4CE-CAD8163E5FD5}"/>
+                  <a16:creationId xmlns:a16="http://schemas.microsoft.com/office/drawing/2014/main" id="{424AAFA2-D535-9A4B-9F7A-CBD7BEC1609F}"/>
                 </a:ext>
               </a:extLst>
             </p:cNvPr>
@@ -3669,10 +3664,10 @@
         </p:sp>
         <p:cxnSp>
           <p:nvCxnSpPr>
-            <p:cNvPr id="107" name="Straight Arrow Connector 106">
+            <p:cNvPr id="11" name="Straight Arrow Connector 10">
               <a:extLst>
                 <a:ext uri="{FF2B5EF4-FFF2-40B4-BE49-F238E27FC236}">
-                  <a16:creationId xmlns:a16="http://schemas.microsoft.com/office/drawing/2014/main" id="{902C9A91-25D8-334C-BA5C-04909AB1E697}"/>
+                  <a16:creationId xmlns:a16="http://schemas.microsoft.com/office/drawing/2014/main" id="{425C605D-E892-A547-91C0-A832CF3294B2}"/>
                 </a:ext>
               </a:extLst>
             </p:cNvPr>
@@ -3713,12 +3708,50 @@
           </p:style>
         </p:cxnSp>
       </p:grpSp>
+      <p:sp>
+        <p:nvSpPr>
+          <p:cNvPr id="12" name="TextBox 11">
+            <a:extLst>
+              <a:ext uri="{FF2B5EF4-FFF2-40B4-BE49-F238E27FC236}">
+                <a16:creationId xmlns:a16="http://schemas.microsoft.com/office/drawing/2014/main" id="{63187649-A124-C049-9150-D48F3E7D5370}"/>
+              </a:ext>
+            </a:extLst>
+          </p:cNvPr>
+          <p:cNvSpPr txBox="1"/>
+          <p:nvPr/>
+        </p:nvSpPr>
+        <p:spPr>
+          <a:xfrm>
+            <a:off x="366703" y="1906646"/>
+            <a:ext cx="1417375" cy="269304"/>
+          </a:xfrm>
+          <a:prstGeom prst="rect">
+            <a:avLst/>
+          </a:prstGeom>
+          <a:noFill/>
+        </p:spPr>
+        <p:txBody>
+          <a:bodyPr wrap="none" rtlCol="0">
+            <a:spAutoFit/>
+          </a:bodyPr>
+          <a:lstStyle/>
+          <a:p>
+            <a:pPr algn="ctr"/>
+            <a:r>
+              <a:rPr lang="en-US" sz="1150" b="1" dirty="0">
+                <a:latin typeface="Helvetica" pitchFamily="2" charset="0"/>
+              </a:rPr>
+              <a:t>Part I: Pre-insight</a:t>
+            </a:r>
+          </a:p>
+        </p:txBody>
+      </p:sp>
       <p:grpSp>
         <p:nvGrpSpPr>
-          <p:cNvPr id="112" name="Group 111">
+          <p:cNvPr id="13" name="Group 12">
             <a:extLst>
               <a:ext uri="{FF2B5EF4-FFF2-40B4-BE49-F238E27FC236}">
-                <a16:creationId xmlns:a16="http://schemas.microsoft.com/office/drawing/2014/main" id="{E242FB5F-3F0D-554C-8326-7BA6CE8EB027}"/>
+                <a16:creationId xmlns:a16="http://schemas.microsoft.com/office/drawing/2014/main" id="{E9DE0BC8-CE1A-984B-B283-16FB3B761F2D}"/>
               </a:ext>
             </a:extLst>
           </p:cNvPr>
@@ -3727,7 +3760,7 @@
         </p:nvGrpSpPr>
         <p:grpSpPr>
           <a:xfrm>
-            <a:off x="5465566" y="2267807"/>
+            <a:off x="5437930" y="2279021"/>
             <a:ext cx="1272766" cy="1185927"/>
             <a:chOff x="656272" y="1774980"/>
             <a:chExt cx="1107216" cy="1031673"/>
@@ -3735,10 +3768,10 @@
         </p:grpSpPr>
         <p:sp>
           <p:nvSpPr>
-            <p:cNvPr id="113" name="Rectangle 112">
+            <p:cNvPr id="14" name="Rectangle 13">
               <a:extLst>
                 <a:ext uri="{FF2B5EF4-FFF2-40B4-BE49-F238E27FC236}">
-                  <a16:creationId xmlns:a16="http://schemas.microsoft.com/office/drawing/2014/main" id="{8217ACF2-57E9-5C4E-B1FC-CF29A0C34B8D}"/>
+                  <a16:creationId xmlns:a16="http://schemas.microsoft.com/office/drawing/2014/main" id="{383343E9-2419-1743-AAE4-FC3B8766F152}"/>
                 </a:ext>
               </a:extLst>
             </p:cNvPr>
@@ -3797,10 +3830,10 @@
         </p:sp>
         <p:sp>
           <p:nvSpPr>
-            <p:cNvPr id="114" name="Rectangle 113">
+            <p:cNvPr id="15" name="Rectangle 14">
               <a:extLst>
                 <a:ext uri="{FF2B5EF4-FFF2-40B4-BE49-F238E27FC236}">
-                  <a16:creationId xmlns:a16="http://schemas.microsoft.com/office/drawing/2014/main" id="{E84A9056-AD73-664C-A550-5601894360EC}"/>
+                  <a16:creationId xmlns:a16="http://schemas.microsoft.com/office/drawing/2014/main" id="{A7995080-7ED9-9643-A287-887511931039}"/>
                 </a:ext>
               </a:extLst>
             </p:cNvPr>
@@ -3851,10 +3884,10 @@
         </p:sp>
         <p:pic>
           <p:nvPicPr>
-            <p:cNvPr id="115" name="Picture 114">
+            <p:cNvPr id="16" name="Picture 15">
               <a:extLst>
                 <a:ext uri="{FF2B5EF4-FFF2-40B4-BE49-F238E27FC236}">
-                  <a16:creationId xmlns:a16="http://schemas.microsoft.com/office/drawing/2014/main" id="{27A0AE87-A44C-5148-99F6-CE42FE0DD281}"/>
+                  <a16:creationId xmlns:a16="http://schemas.microsoft.com/office/drawing/2014/main" id="{1A5B572D-0FA2-3F44-8986-809A2FB621D6}"/>
                 </a:ext>
               </a:extLst>
             </p:cNvPr>
@@ -3880,10 +3913,10 @@
         </p:pic>
         <p:sp>
           <p:nvSpPr>
-            <p:cNvPr id="116" name="TextBox 115">
+            <p:cNvPr id="17" name="TextBox 16">
               <a:extLst>
                 <a:ext uri="{FF2B5EF4-FFF2-40B4-BE49-F238E27FC236}">
-                  <a16:creationId xmlns:a16="http://schemas.microsoft.com/office/drawing/2014/main" id="{DF793859-077F-0743-B95B-BFD974297EE3}"/>
+                  <a16:creationId xmlns:a16="http://schemas.microsoft.com/office/drawing/2014/main" id="{44622B76-5883-144A-B8C5-0FAF38FA21FA}"/>
                 </a:ext>
               </a:extLst>
             </p:cNvPr>
@@ -3918,10 +3951,10 @@
         </p:sp>
         <p:sp>
           <p:nvSpPr>
-            <p:cNvPr id="117" name="TextBox 116">
+            <p:cNvPr id="18" name="TextBox 17">
               <a:extLst>
                 <a:ext uri="{FF2B5EF4-FFF2-40B4-BE49-F238E27FC236}">
-                  <a16:creationId xmlns:a16="http://schemas.microsoft.com/office/drawing/2014/main" id="{B2459E70-2DC4-8743-B403-0DBBA583BAB0}"/>
+                  <a16:creationId xmlns:a16="http://schemas.microsoft.com/office/drawing/2014/main" id="{B7164673-1252-1740-A0C3-23152DC1F4EE}"/>
                 </a:ext>
               </a:extLst>
             </p:cNvPr>
@@ -3967,10 +4000,10 @@
         </p:sp>
         <p:cxnSp>
           <p:nvCxnSpPr>
-            <p:cNvPr id="118" name="Straight Arrow Connector 117">
+            <p:cNvPr id="19" name="Straight Arrow Connector 18">
               <a:extLst>
                 <a:ext uri="{FF2B5EF4-FFF2-40B4-BE49-F238E27FC236}">
-                  <a16:creationId xmlns:a16="http://schemas.microsoft.com/office/drawing/2014/main" id="{F11DF966-BF2C-EF4F-B380-2679BA6D7D8F}"/>
+                  <a16:creationId xmlns:a16="http://schemas.microsoft.com/office/drawing/2014/main" id="{2B4F7413-EF4C-894A-9125-F21E9580E753}"/>
                 </a:ext>
               </a:extLst>
             </p:cNvPr>
@@ -4011,12 +4044,50 @@
           </p:style>
         </p:cxnSp>
       </p:grpSp>
+      <p:sp>
+        <p:nvSpPr>
+          <p:cNvPr id="20" name="TextBox 19">
+            <a:extLst>
+              <a:ext uri="{FF2B5EF4-FFF2-40B4-BE49-F238E27FC236}">
+                <a16:creationId xmlns:a16="http://schemas.microsoft.com/office/drawing/2014/main" id="{81CCCDA0-9C06-6742-8542-EC5A817FEC40}"/>
+              </a:ext>
+            </a:extLst>
+          </p:cNvPr>
+          <p:cNvSpPr txBox="1"/>
+          <p:nvPr/>
+        </p:nvSpPr>
+        <p:spPr>
+          <a:xfrm>
+            <a:off x="5427235" y="1903646"/>
+            <a:ext cx="1582484" cy="269304"/>
+          </a:xfrm>
+          <a:prstGeom prst="rect">
+            <a:avLst/>
+          </a:prstGeom>
+          <a:noFill/>
+        </p:spPr>
+        <p:txBody>
+          <a:bodyPr wrap="none" rtlCol="0">
+            <a:spAutoFit/>
+          </a:bodyPr>
+          <a:lstStyle/>
+          <a:p>
+            <a:pPr algn="ctr"/>
+            <a:r>
+              <a:rPr lang="en-US" sz="1150" b="1" dirty="0">
+                <a:latin typeface="Helvetica" pitchFamily="2" charset="0"/>
+              </a:rPr>
+              <a:t>Part III: Post-insight</a:t>
+            </a:r>
+          </a:p>
+        </p:txBody>
+      </p:sp>
       <p:grpSp>
         <p:nvGrpSpPr>
-          <p:cNvPr id="151" name="Group 150">
+          <p:cNvPr id="21" name="Group 20">
             <a:extLst>
               <a:ext uri="{FF2B5EF4-FFF2-40B4-BE49-F238E27FC236}">
-                <a16:creationId xmlns:a16="http://schemas.microsoft.com/office/drawing/2014/main" id="{F8DAF192-0F09-4244-A45B-C6333D75844D}"/>
+                <a16:creationId xmlns:a16="http://schemas.microsoft.com/office/drawing/2014/main" id="{72FCE684-843A-3D4D-A51E-896E80D0691E}"/>
               </a:ext>
             </a:extLst>
           </p:cNvPr>
@@ -4025,18 +4096,18 @@
         </p:nvGrpSpPr>
         <p:grpSpPr>
           <a:xfrm>
-            <a:off x="1857374" y="311246"/>
-            <a:ext cx="3536077" cy="3161655"/>
-            <a:chOff x="2101032" y="238900"/>
-            <a:chExt cx="3076137" cy="2750417"/>
+            <a:off x="1993104" y="303292"/>
+            <a:ext cx="3209195" cy="3161656"/>
+            <a:chOff x="1967079" y="311246"/>
+            <a:chExt cx="3209195" cy="3161656"/>
           </a:xfrm>
         </p:grpSpPr>
         <p:grpSp>
           <p:nvGrpSpPr>
-            <p:cNvPr id="40" name="Group 39">
+            <p:cNvPr id="22" name="Group 21">
               <a:extLst>
                 <a:ext uri="{FF2B5EF4-FFF2-40B4-BE49-F238E27FC236}">
-                  <a16:creationId xmlns:a16="http://schemas.microsoft.com/office/drawing/2014/main" id="{0804C0C5-A32F-944E-A26D-CD3E48620307}"/>
+                  <a16:creationId xmlns:a16="http://schemas.microsoft.com/office/drawing/2014/main" id="{CA0BEEF2-5CB3-2C4A-8CEC-A9E50DDDFAFD}"/>
                 </a:ext>
               </a:extLst>
             </p:cNvPr>
@@ -4045,18 +4116,18 @@
           </p:nvGrpSpPr>
           <p:grpSpPr>
             <a:xfrm>
-              <a:off x="2561405" y="238900"/>
-              <a:ext cx="2129392" cy="1607684"/>
+              <a:off x="2386581" y="311246"/>
+              <a:ext cx="2447776" cy="1848062"/>
               <a:chOff x="2418663" y="92418"/>
               <a:chExt cx="2129392" cy="1607684"/>
             </a:xfrm>
           </p:grpSpPr>
           <p:sp>
             <p:nvSpPr>
-              <p:cNvPr id="6" name="Rectangle 5">
+              <p:cNvPr id="44" name="Rectangle 43">
                 <a:extLst>
                   <a:ext uri="{FF2B5EF4-FFF2-40B4-BE49-F238E27FC236}">
-                    <a16:creationId xmlns:a16="http://schemas.microsoft.com/office/drawing/2014/main" id="{AACBE754-01B5-734A-B682-5C9635414A67}"/>
+                    <a16:creationId xmlns:a16="http://schemas.microsoft.com/office/drawing/2014/main" id="{EA4E7F28-DF16-5E40-9644-885C5947AB15}"/>
                   </a:ext>
                 </a:extLst>
               </p:cNvPr>
@@ -4115,10 +4186,10 @@
           </p:sp>
           <p:sp>
             <p:nvSpPr>
-              <p:cNvPr id="7" name="Rectangle 6">
+              <p:cNvPr id="45" name="Rectangle 44">
                 <a:extLst>
                   <a:ext uri="{FF2B5EF4-FFF2-40B4-BE49-F238E27FC236}">
-                    <a16:creationId xmlns:a16="http://schemas.microsoft.com/office/drawing/2014/main" id="{36E0155D-FCC4-A849-A24A-6AD95DB418E2}"/>
+                    <a16:creationId xmlns:a16="http://schemas.microsoft.com/office/drawing/2014/main" id="{3DD60910-0533-8B4B-AE1B-5C7693639B7D}"/>
                   </a:ext>
                 </a:extLst>
               </p:cNvPr>
@@ -4194,10 +4265,10 @@
           </p:sp>
           <p:sp>
             <p:nvSpPr>
-              <p:cNvPr id="9" name="Rectangle 8">
+              <p:cNvPr id="46" name="Rectangle 45">
                 <a:extLst>
                   <a:ext uri="{FF2B5EF4-FFF2-40B4-BE49-F238E27FC236}">
-                    <a16:creationId xmlns:a16="http://schemas.microsoft.com/office/drawing/2014/main" id="{AB92BE1A-34FC-FC47-A5DB-3BA5550B8382}"/>
+                    <a16:creationId xmlns:a16="http://schemas.microsoft.com/office/drawing/2014/main" id="{FF0DCCCD-FC1C-7841-B8CB-A18CABE5604C}"/>
                   </a:ext>
                 </a:extLst>
               </p:cNvPr>
@@ -4265,10 +4336,10 @@
           </p:sp>
           <p:sp>
             <p:nvSpPr>
-              <p:cNvPr id="11" name="Rectangle 10">
+              <p:cNvPr id="47" name="Rectangle 46">
                 <a:extLst>
                   <a:ext uri="{FF2B5EF4-FFF2-40B4-BE49-F238E27FC236}">
-                    <a16:creationId xmlns:a16="http://schemas.microsoft.com/office/drawing/2014/main" id="{E982386E-878D-0F48-B424-4BE29AF2D757}"/>
+                    <a16:creationId xmlns:a16="http://schemas.microsoft.com/office/drawing/2014/main" id="{534F4D4F-237C-9041-B22C-42FE45003B60}"/>
                   </a:ext>
                 </a:extLst>
               </p:cNvPr>
@@ -4319,10 +4390,10 @@
           </p:sp>
           <p:pic>
             <p:nvPicPr>
-              <p:cNvPr id="13" name="Picture 12">
+              <p:cNvPr id="48" name="Picture 47">
                 <a:extLst>
                   <a:ext uri="{FF2B5EF4-FFF2-40B4-BE49-F238E27FC236}">
-                    <a16:creationId xmlns:a16="http://schemas.microsoft.com/office/drawing/2014/main" id="{70FA1F4F-DD96-664D-B241-8BE8391290B7}"/>
+                    <a16:creationId xmlns:a16="http://schemas.microsoft.com/office/drawing/2014/main" id="{B9516599-9B9E-AC44-92B2-CB6AFEC2406E}"/>
                   </a:ext>
                 </a:extLst>
               </p:cNvPr>
@@ -4348,10 +4419,10 @@
           </p:pic>
           <p:sp>
             <p:nvSpPr>
-              <p:cNvPr id="15" name="TextBox 14">
+              <p:cNvPr id="49" name="TextBox 48">
                 <a:extLst>
                   <a:ext uri="{FF2B5EF4-FFF2-40B4-BE49-F238E27FC236}">
-                    <a16:creationId xmlns:a16="http://schemas.microsoft.com/office/drawing/2014/main" id="{8BE2B34B-DD6B-1E41-AF6B-7A385415A8BF}"/>
+                    <a16:creationId xmlns:a16="http://schemas.microsoft.com/office/drawing/2014/main" id="{2C35AEDD-0453-6042-8F19-54DEBEBD523F}"/>
                   </a:ext>
                 </a:extLst>
               </p:cNvPr>
@@ -4386,10 +4457,10 @@
           </p:sp>
           <p:sp>
             <p:nvSpPr>
-              <p:cNvPr id="16" name="TextBox 15">
+              <p:cNvPr id="50" name="TextBox 49">
                 <a:extLst>
                   <a:ext uri="{FF2B5EF4-FFF2-40B4-BE49-F238E27FC236}">
-                    <a16:creationId xmlns:a16="http://schemas.microsoft.com/office/drawing/2014/main" id="{F9B2091C-1D46-604F-A91F-271CF23A7AC6}"/>
+                    <a16:creationId xmlns:a16="http://schemas.microsoft.com/office/drawing/2014/main" id="{5156B857-FDA9-0D4C-B47F-D03D80FE0C12}"/>
                   </a:ext>
                 </a:extLst>
               </p:cNvPr>
@@ -4424,10 +4495,10 @@
           </p:sp>
           <p:sp>
             <p:nvSpPr>
-              <p:cNvPr id="17" name="TextBox 16">
+              <p:cNvPr id="51" name="TextBox 50">
                 <a:extLst>
                   <a:ext uri="{FF2B5EF4-FFF2-40B4-BE49-F238E27FC236}">
-                    <a16:creationId xmlns:a16="http://schemas.microsoft.com/office/drawing/2014/main" id="{41402935-9678-C640-94A7-37B8EE2CAC7B}"/>
+                    <a16:creationId xmlns:a16="http://schemas.microsoft.com/office/drawing/2014/main" id="{28596C25-B176-1747-B948-3D4697C26C3E}"/>
                   </a:ext>
                 </a:extLst>
               </p:cNvPr>
@@ -4462,10 +4533,10 @@
           </p:sp>
           <p:sp>
             <p:nvSpPr>
-              <p:cNvPr id="18" name="TextBox 17">
+              <p:cNvPr id="52" name="TextBox 51">
                 <a:extLst>
                   <a:ext uri="{FF2B5EF4-FFF2-40B4-BE49-F238E27FC236}">
-                    <a16:creationId xmlns:a16="http://schemas.microsoft.com/office/drawing/2014/main" id="{05C2A363-A8A3-9447-B381-E3CC122A576E}"/>
+                    <a16:creationId xmlns:a16="http://schemas.microsoft.com/office/drawing/2014/main" id="{0524151B-0A14-A144-9693-FACF7FC9A53B}"/>
                   </a:ext>
                 </a:extLst>
               </p:cNvPr>
@@ -4500,10 +4571,10 @@
           </p:sp>
           <p:sp>
             <p:nvSpPr>
-              <p:cNvPr id="19" name="TextBox 18">
+              <p:cNvPr id="53" name="TextBox 52">
                 <a:extLst>
                   <a:ext uri="{FF2B5EF4-FFF2-40B4-BE49-F238E27FC236}">
-                    <a16:creationId xmlns:a16="http://schemas.microsoft.com/office/drawing/2014/main" id="{3B47540E-D7B3-6F40-A692-C3211A43C733}"/>
+                    <a16:creationId xmlns:a16="http://schemas.microsoft.com/office/drawing/2014/main" id="{7329E33E-BCE6-8D45-9293-0FDBA79178E1}"/>
                   </a:ext>
                 </a:extLst>
               </p:cNvPr>
@@ -4549,10 +4620,10 @@
           </p:sp>
           <p:cxnSp>
             <p:nvCxnSpPr>
-              <p:cNvPr id="21" name="Straight Arrow Connector 20">
+              <p:cNvPr id="54" name="Straight Arrow Connector 53">
                 <a:extLst>
                   <a:ext uri="{FF2B5EF4-FFF2-40B4-BE49-F238E27FC236}">
-                    <a16:creationId xmlns:a16="http://schemas.microsoft.com/office/drawing/2014/main" id="{E653783C-4996-D94F-9734-3407CB30A4BC}"/>
+                    <a16:creationId xmlns:a16="http://schemas.microsoft.com/office/drawing/2014/main" id="{2D9D64EA-C25E-484A-A3B7-0DBD4FA0CBAE}"/>
                   </a:ext>
                 </a:extLst>
               </p:cNvPr>
@@ -4594,10 +4665,10 @@
           </p:cxnSp>
           <p:sp>
             <p:nvSpPr>
-              <p:cNvPr id="14" name="Rectangle 13">
+              <p:cNvPr id="55" name="Rectangle 54">
                 <a:extLst>
                   <a:ext uri="{FF2B5EF4-FFF2-40B4-BE49-F238E27FC236}">
-                    <a16:creationId xmlns:a16="http://schemas.microsoft.com/office/drawing/2014/main" id="{B30549CE-282C-5043-AED1-4563D5F4201D}"/>
+                    <a16:creationId xmlns:a16="http://schemas.microsoft.com/office/drawing/2014/main" id="{23FCAA11-839E-574D-9EE5-4F9DBF03536A}"/>
                   </a:ext>
                 </a:extLst>
               </p:cNvPr>
@@ -4674,10 +4745,10 @@
         </p:grpSp>
         <p:grpSp>
           <p:nvGrpSpPr>
-            <p:cNvPr id="41" name="Group 40">
+            <p:cNvPr id="23" name="Group 22">
               <a:extLst>
                 <a:ext uri="{FF2B5EF4-FFF2-40B4-BE49-F238E27FC236}">
-                  <a16:creationId xmlns:a16="http://schemas.microsoft.com/office/drawing/2014/main" id="{9F955F9B-CA2E-A940-9D1F-108851D0E1C9}"/>
+                  <a16:creationId xmlns:a16="http://schemas.microsoft.com/office/drawing/2014/main" id="{8B062A64-E48D-4646-8ECA-3A988B3F5C72}"/>
                 </a:ext>
               </a:extLst>
             </p:cNvPr>
@@ -4686,18 +4757,18 @@
           </p:nvGrpSpPr>
           <p:grpSpPr>
             <a:xfrm>
-              <a:off x="2264863" y="2051142"/>
-              <a:ext cx="2715769" cy="404342"/>
+              <a:off x="2045701" y="2394452"/>
+              <a:ext cx="3094327" cy="464799"/>
               <a:chOff x="2367826" y="2123786"/>
-              <a:chExt cx="2715769" cy="404342"/>
+              <a:chExt cx="2691845" cy="404342"/>
             </a:xfrm>
           </p:grpSpPr>
           <p:sp>
             <p:nvSpPr>
-              <p:cNvPr id="36" name="TextBox 35">
+              <p:cNvPr id="40" name="TextBox 39">
                 <a:extLst>
                   <a:ext uri="{FF2B5EF4-FFF2-40B4-BE49-F238E27FC236}">
-                    <a16:creationId xmlns:a16="http://schemas.microsoft.com/office/drawing/2014/main" id="{AB67C793-7092-8C44-BCE2-5B5F0B4548FC}"/>
+                    <a16:creationId xmlns:a16="http://schemas.microsoft.com/office/drawing/2014/main" id="{2D10C53E-B059-B446-A8CB-F7612BA434A2}"/>
                   </a:ext>
                 </a:extLst>
               </p:cNvPr>
@@ -4743,10 +4814,10 @@
           </p:sp>
           <p:sp>
             <p:nvSpPr>
-              <p:cNvPr id="37" name="TextBox 36">
+              <p:cNvPr id="41" name="TextBox 40">
                 <a:extLst>
                   <a:ext uri="{FF2B5EF4-FFF2-40B4-BE49-F238E27FC236}">
-                    <a16:creationId xmlns:a16="http://schemas.microsoft.com/office/drawing/2014/main" id="{1FE1168C-D7DE-144A-B2D8-3C4661234EB1}"/>
+                    <a16:creationId xmlns:a16="http://schemas.microsoft.com/office/drawing/2014/main" id="{F99FF90C-4228-B142-BE3D-6B8AEE6861F8}"/>
                   </a:ext>
                 </a:extLst>
               </p:cNvPr>
@@ -4803,10 +4874,10 @@
           </p:sp>
           <p:sp>
             <p:nvSpPr>
-              <p:cNvPr id="38" name="TextBox 37">
+              <p:cNvPr id="42" name="TextBox 41">
                 <a:extLst>
                   <a:ext uri="{FF2B5EF4-FFF2-40B4-BE49-F238E27FC236}">
-                    <a16:creationId xmlns:a16="http://schemas.microsoft.com/office/drawing/2014/main" id="{21AEA2D6-0BF4-9848-BDF6-0FF27847CB5B}"/>
+                    <a16:creationId xmlns:a16="http://schemas.microsoft.com/office/drawing/2014/main" id="{80F32425-6D92-E940-9065-7BE267F40E5D}"/>
                   </a:ext>
                 </a:extLst>
               </p:cNvPr>
@@ -4863,10 +4934,10 @@
           </p:sp>
           <p:sp>
             <p:nvSpPr>
-              <p:cNvPr id="39" name="TextBox 38">
+              <p:cNvPr id="43" name="TextBox 42">
                 <a:extLst>
                   <a:ext uri="{FF2B5EF4-FFF2-40B4-BE49-F238E27FC236}">
-                    <a16:creationId xmlns:a16="http://schemas.microsoft.com/office/drawing/2014/main" id="{DEA171B9-4740-FC49-9E62-AAACE7CF33BE}"/>
+                    <a16:creationId xmlns:a16="http://schemas.microsoft.com/office/drawing/2014/main" id="{7B03C202-91C2-5841-B9D7-692587A3D8DB}"/>
                   </a:ext>
                 </a:extLst>
               </p:cNvPr>
@@ -4875,7 +4946,7 @@
             </p:nvSpPr>
             <p:spPr>
               <a:xfrm>
-                <a:off x="4496232" y="2123786"/>
+                <a:off x="4472308" y="2123786"/>
                 <a:ext cx="587363" cy="403623"/>
               </a:xfrm>
               <a:prstGeom prst="rect">
@@ -4922,10 +4993,10 @@
         </p:grpSp>
         <p:grpSp>
           <p:nvGrpSpPr>
-            <p:cNvPr id="92" name="Group 91">
+            <p:cNvPr id="24" name="Group 23">
               <a:extLst>
                 <a:ext uri="{FF2B5EF4-FFF2-40B4-BE49-F238E27FC236}">
-                  <a16:creationId xmlns:a16="http://schemas.microsoft.com/office/drawing/2014/main" id="{C3511574-C1C2-8D4A-9561-378FCBFD9A3D}"/>
+                  <a16:creationId xmlns:a16="http://schemas.microsoft.com/office/drawing/2014/main" id="{3B033469-A485-D246-A0A3-BDF3CCCE219B}"/>
                 </a:ext>
               </a:extLst>
             </p:cNvPr>
@@ -4934,18 +5005,18 @@
           </p:nvGrpSpPr>
           <p:grpSpPr>
             <a:xfrm>
-              <a:off x="2582250" y="1639060"/>
-              <a:ext cx="2136959" cy="466662"/>
-              <a:chOff x="2439508" y="1492578"/>
-              <a:chExt cx="2136959" cy="466662"/>
+              <a:off x="2410544" y="2142045"/>
+              <a:ext cx="2391894" cy="315149"/>
+              <a:chOff x="2439508" y="1685083"/>
+              <a:chExt cx="2080779" cy="274157"/>
             </a:xfrm>
           </p:grpSpPr>
           <p:cxnSp>
             <p:nvCxnSpPr>
-              <p:cNvPr id="53" name="Straight Connector 52">
+              <p:cNvPr id="31" name="Straight Connector 30">
                 <a:extLst>
                   <a:ext uri="{FF2B5EF4-FFF2-40B4-BE49-F238E27FC236}">
-                    <a16:creationId xmlns:a16="http://schemas.microsoft.com/office/drawing/2014/main" id="{AF352A13-44D7-5E4A-9E4D-C418737EF52B}"/>
+                    <a16:creationId xmlns:a16="http://schemas.microsoft.com/office/drawing/2014/main" id="{098C6E52-0675-7543-B790-7CADCF9ACAE1}"/>
                   </a:ext>
                 </a:extLst>
               </p:cNvPr>
@@ -4956,8 +5027,8 @@
             </p:nvCxnSpPr>
             <p:spPr>
               <a:xfrm flipH="1">
-                <a:off x="3417931" y="1638568"/>
-                <a:ext cx="1158536" cy="0"/>
+                <a:off x="3458001" y="1685083"/>
+                <a:ext cx="794861" cy="1"/>
               </a:xfrm>
               <a:prstGeom prst="line">
                 <a:avLst/>
@@ -4985,10 +5056,10 @@
           </p:cxnSp>
           <p:cxnSp>
             <p:nvCxnSpPr>
-              <p:cNvPr id="55" name="Straight Connector 54">
+              <p:cNvPr id="33" name="Straight Connector 32">
                 <a:extLst>
                   <a:ext uri="{FF2B5EF4-FFF2-40B4-BE49-F238E27FC236}">
-                    <a16:creationId xmlns:a16="http://schemas.microsoft.com/office/drawing/2014/main" id="{0D7D7181-0283-5D43-BA34-847A0FE4A106}"/>
+                    <a16:creationId xmlns:a16="http://schemas.microsoft.com/office/drawing/2014/main" id="{39C6A6B3-172A-D04F-821E-FF21AEEDD3E8}"/>
                   </a:ext>
                 </a:extLst>
               </p:cNvPr>
@@ -4998,9 +5069,9 @@
               <p:nvPr/>
             </p:nvCxnSpPr>
             <p:spPr>
-              <a:xfrm>
-                <a:off x="3417931" y="1636288"/>
-                <a:ext cx="0" cy="172163"/>
+              <a:xfrm flipV="1">
+                <a:off x="2439508" y="1808450"/>
+                <a:ext cx="2078457" cy="1"/>
               </a:xfrm>
               <a:prstGeom prst="line">
                 <a:avLst/>
@@ -5028,65 +5099,22 @@
           </p:cxnSp>
           <p:cxnSp>
             <p:nvCxnSpPr>
-              <p:cNvPr id="59" name="Straight Connector 58">
+              <p:cNvPr id="34" name="Straight Connector 33">
                 <a:extLst>
                   <a:ext uri="{FF2B5EF4-FFF2-40B4-BE49-F238E27FC236}">
-                    <a16:creationId xmlns:a16="http://schemas.microsoft.com/office/drawing/2014/main" id="{DE7B9569-2F6E-5045-910E-FF0E35FBD07B}"/>
+                    <a16:creationId xmlns:a16="http://schemas.microsoft.com/office/drawing/2014/main" id="{3AF2BC6E-77A9-C042-B08A-F1810C5C342E}"/>
                   </a:ext>
                 </a:extLst>
               </p:cNvPr>
               <p:cNvCxnSpPr>
                 <a:cxnSpLocks/>
-              </p:cNvCxnSpPr>
-              <p:nvPr/>
-            </p:nvCxnSpPr>
-            <p:spPr>
-              <a:xfrm>
-                <a:off x="2439508" y="1808451"/>
-                <a:ext cx="2104700" cy="0"/>
-              </a:xfrm>
-              <a:prstGeom prst="line">
-                <a:avLst/>
-              </a:prstGeom>
-              <a:ln w="12700">
-                <a:solidFill>
-                  <a:schemeClr val="tx1"/>
-                </a:solidFill>
-              </a:ln>
-            </p:spPr>
-            <p:style>
-              <a:lnRef idx="1">
-                <a:schemeClr val="accent1"/>
-              </a:lnRef>
-              <a:fillRef idx="0">
-                <a:schemeClr val="accent1"/>
-              </a:fillRef>
-              <a:effectRef idx="0">
-                <a:schemeClr val="accent1"/>
-              </a:effectRef>
-              <a:fontRef idx="minor">
-                <a:schemeClr val="tx1"/>
-              </a:fontRef>
-            </p:style>
-          </p:cxnSp>
-          <p:cxnSp>
-            <p:nvCxnSpPr>
-              <p:cNvPr id="63" name="Straight Connector 62">
-                <a:extLst>
-                  <a:ext uri="{FF2B5EF4-FFF2-40B4-BE49-F238E27FC236}">
-                    <a16:creationId xmlns:a16="http://schemas.microsoft.com/office/drawing/2014/main" id="{3DDADF85-F4CF-4040-92A7-114CA9059AE0}"/>
-                  </a:ext>
-                </a:extLst>
-              </p:cNvPr>
-              <p:cNvCxnSpPr>
-                <a:cxnSpLocks/>
-                <a:stCxn id="39" idx="0"/>
+                <a:stCxn id="43" idx="0"/>
               </p:cNvCxnSpPr>
               <p:nvPr/>
             </p:nvCxnSpPr>
             <p:spPr>
               <a:xfrm flipV="1">
-                <a:off x="4544209" y="1808451"/>
+                <a:off x="4520287" y="1808451"/>
                 <a:ext cx="0" cy="96209"/>
               </a:xfrm>
               <a:prstGeom prst="line">
@@ -5115,10 +5143,10 @@
           </p:cxnSp>
           <p:cxnSp>
             <p:nvCxnSpPr>
-              <p:cNvPr id="67" name="Straight Connector 66">
+              <p:cNvPr id="35" name="Straight Connector 34">
                 <a:extLst>
                   <a:ext uri="{FF2B5EF4-FFF2-40B4-BE49-F238E27FC236}">
-                    <a16:creationId xmlns:a16="http://schemas.microsoft.com/office/drawing/2014/main" id="{FCE399A9-E165-CB4D-B4AC-A34550246ED1}"/>
+                    <a16:creationId xmlns:a16="http://schemas.microsoft.com/office/drawing/2014/main" id="{DB3F0B57-47AD-374B-8961-6E33A26C0B86}"/>
                   </a:ext>
                 </a:extLst>
               </p:cNvPr>
@@ -5158,10 +5186,10 @@
           </p:cxnSp>
           <p:cxnSp>
             <p:nvCxnSpPr>
-              <p:cNvPr id="68" name="Straight Connector 67">
+              <p:cNvPr id="36" name="Straight Connector 35">
                 <a:extLst>
                   <a:ext uri="{FF2B5EF4-FFF2-40B4-BE49-F238E27FC236}">
-                    <a16:creationId xmlns:a16="http://schemas.microsoft.com/office/drawing/2014/main" id="{D4473AA6-F5A8-A643-BBB6-4831BEFC2B9C}"/>
+                    <a16:creationId xmlns:a16="http://schemas.microsoft.com/office/drawing/2014/main" id="{4170D156-D8C3-A442-AB99-09C19BF1DFD1}"/>
                   </a:ext>
                 </a:extLst>
               </p:cNvPr>
@@ -5201,16 +5229,16 @@
           </p:cxnSp>
           <p:cxnSp>
             <p:nvCxnSpPr>
-              <p:cNvPr id="69" name="Straight Connector 68">
+              <p:cNvPr id="37" name="Straight Connector 36">
                 <a:extLst>
                   <a:ext uri="{FF2B5EF4-FFF2-40B4-BE49-F238E27FC236}">
-                    <a16:creationId xmlns:a16="http://schemas.microsoft.com/office/drawing/2014/main" id="{D437E404-6B9A-C44B-B4F9-96B57FF9EC08}"/>
+                    <a16:creationId xmlns:a16="http://schemas.microsoft.com/office/drawing/2014/main" id="{ADAF9433-56F3-8248-BAC6-493179C1F0DC}"/>
                   </a:ext>
                 </a:extLst>
               </p:cNvPr>
               <p:cNvCxnSpPr>
                 <a:cxnSpLocks/>
-                <a:stCxn id="36" idx="0"/>
+                <a:stCxn id="40" idx="0"/>
               </p:cNvCxnSpPr>
               <p:nvPr/>
             </p:nvCxnSpPr>
@@ -5243,99 +5271,13 @@
               </a:fontRef>
             </p:style>
           </p:cxnSp>
-          <p:cxnSp>
-            <p:nvCxnSpPr>
-              <p:cNvPr id="74" name="Straight Connector 73">
-                <a:extLst>
-                  <a:ext uri="{FF2B5EF4-FFF2-40B4-BE49-F238E27FC236}">
-                    <a16:creationId xmlns:a16="http://schemas.microsoft.com/office/drawing/2014/main" id="{8562F51F-F604-D74C-8AE2-729394923BC7}"/>
-                  </a:ext>
-                </a:extLst>
-              </p:cNvPr>
-              <p:cNvCxnSpPr>
-                <a:cxnSpLocks/>
-              </p:cNvCxnSpPr>
-              <p:nvPr/>
-            </p:nvCxnSpPr>
-            <p:spPr>
-              <a:xfrm>
-                <a:off x="4576467" y="1492578"/>
-                <a:ext cx="0" cy="143710"/>
-              </a:xfrm>
-              <a:prstGeom prst="line">
-                <a:avLst/>
-              </a:prstGeom>
-              <a:ln w="12700">
-                <a:solidFill>
-                  <a:schemeClr val="tx1"/>
-                </a:solidFill>
-              </a:ln>
-            </p:spPr>
-            <p:style>
-              <a:lnRef idx="1">
-                <a:schemeClr val="accent1"/>
-              </a:lnRef>
-              <a:fillRef idx="0">
-                <a:schemeClr val="accent1"/>
-              </a:fillRef>
-              <a:effectRef idx="0">
-                <a:schemeClr val="accent1"/>
-              </a:effectRef>
-              <a:fontRef idx="minor">
-                <a:schemeClr val="tx1"/>
-              </a:fontRef>
-            </p:style>
-          </p:cxnSp>
-          <p:cxnSp>
-            <p:nvCxnSpPr>
-              <p:cNvPr id="82" name="Straight Connector 81">
-                <a:extLst>
-                  <a:ext uri="{FF2B5EF4-FFF2-40B4-BE49-F238E27FC236}">
-                    <a16:creationId xmlns:a16="http://schemas.microsoft.com/office/drawing/2014/main" id="{33AEC2E7-0D6C-974C-AFB6-22B39586A080}"/>
-                  </a:ext>
-                </a:extLst>
-              </p:cNvPr>
-              <p:cNvCxnSpPr>
-                <a:cxnSpLocks/>
-              </p:cNvCxnSpPr>
-              <p:nvPr/>
-            </p:nvCxnSpPr>
-            <p:spPr>
-              <a:xfrm rot="5400000" flipV="1">
-                <a:off x="4522467" y="1438578"/>
-                <a:ext cx="0" cy="108000"/>
-              </a:xfrm>
-              <a:prstGeom prst="line">
-                <a:avLst/>
-              </a:prstGeom>
-              <a:ln w="12700">
-                <a:solidFill>
-                  <a:schemeClr val="tx1"/>
-                </a:solidFill>
-              </a:ln>
-            </p:spPr>
-            <p:style>
-              <a:lnRef idx="1">
-                <a:schemeClr val="accent1"/>
-              </a:lnRef>
-              <a:fillRef idx="0">
-                <a:schemeClr val="accent1"/>
-              </a:fillRef>
-              <a:effectRef idx="0">
-                <a:schemeClr val="accent1"/>
-              </a:effectRef>
-              <a:fontRef idx="minor">
-                <a:schemeClr val="tx1"/>
-              </a:fontRef>
-            </p:style>
-          </p:cxnSp>
         </p:grpSp>
         <p:grpSp>
           <p:nvGrpSpPr>
-            <p:cNvPr id="93" name="Group 92">
+            <p:cNvPr id="25" name="Group 24">
               <a:extLst>
                 <a:ext uri="{FF2B5EF4-FFF2-40B4-BE49-F238E27FC236}">
-                  <a16:creationId xmlns:a16="http://schemas.microsoft.com/office/drawing/2014/main" id="{67CF487F-3F61-0D46-9F3A-4C041CA753AC}"/>
+                  <a16:creationId xmlns:a16="http://schemas.microsoft.com/office/drawing/2014/main" id="{7659D7E4-484B-8543-A142-A2276E983EF3}"/>
                 </a:ext>
               </a:extLst>
             </p:cNvPr>
@@ -5344,18 +5286,18 @@
           </p:nvGrpSpPr>
           <p:grpSpPr>
             <a:xfrm>
-              <a:off x="2196468" y="2447096"/>
-              <a:ext cx="1455161" cy="540107"/>
+              <a:off x="1967079" y="2849608"/>
+              <a:ext cx="1672735" cy="620863"/>
               <a:chOff x="2053726" y="2300614"/>
               <a:chExt cx="1455161" cy="540107"/>
             </a:xfrm>
           </p:grpSpPr>
           <p:sp>
             <p:nvSpPr>
-              <p:cNvPr id="87" name="TextBox 86">
+              <p:cNvPr id="29" name="TextBox 28">
                 <a:extLst>
                   <a:ext uri="{FF2B5EF4-FFF2-40B4-BE49-F238E27FC236}">
-                    <a16:creationId xmlns:a16="http://schemas.microsoft.com/office/drawing/2014/main" id="{3A9AC6E8-90E1-3244-96A7-6A63EEFE0851}"/>
+                    <a16:creationId xmlns:a16="http://schemas.microsoft.com/office/drawing/2014/main" id="{C89E2490-24DF-B243-9EE7-8D871C598A72}"/>
                   </a:ext>
                 </a:extLst>
               </p:cNvPr>
@@ -5433,10 +5375,10 @@
           </p:sp>
           <p:sp>
             <p:nvSpPr>
-              <p:cNvPr id="89" name="Left Brace 88">
+              <p:cNvPr id="30" name="Left Brace 29">
                 <a:extLst>
                   <a:ext uri="{FF2B5EF4-FFF2-40B4-BE49-F238E27FC236}">
-                    <a16:creationId xmlns:a16="http://schemas.microsoft.com/office/drawing/2014/main" id="{2CD58671-EE38-EF4A-84AD-A113C16D8331}"/>
+                    <a16:creationId xmlns:a16="http://schemas.microsoft.com/office/drawing/2014/main" id="{3B67252F-5296-014B-A7FF-EA8CD56E98AD}"/>
                   </a:ext>
                 </a:extLst>
               </p:cNvPr>
@@ -5486,10 +5428,10 @@
         </p:grpSp>
         <p:grpSp>
           <p:nvGrpSpPr>
-            <p:cNvPr id="94" name="Group 93">
+            <p:cNvPr id="26" name="Group 25">
               <a:extLst>
                 <a:ext uri="{FF2B5EF4-FFF2-40B4-BE49-F238E27FC236}">
-                  <a16:creationId xmlns:a16="http://schemas.microsoft.com/office/drawing/2014/main" id="{73D3C6F5-8AC1-654E-A5CF-65E9B2D40238}"/>
+                  <a16:creationId xmlns:a16="http://schemas.microsoft.com/office/drawing/2014/main" id="{4CE01A25-F209-024F-BC46-984FB6B98E14}"/>
                 </a:ext>
               </a:extLst>
             </p:cNvPr>
@@ -5498,18 +5440,18 @@
           </p:nvGrpSpPr>
           <p:grpSpPr>
             <a:xfrm>
-              <a:off x="3557708" y="2447094"/>
-              <a:ext cx="1422648" cy="542223"/>
-              <a:chOff x="3414966" y="2300612"/>
-              <a:chExt cx="1422648" cy="542223"/>
+              <a:off x="3540914" y="2849608"/>
+              <a:ext cx="1635360" cy="623294"/>
+              <a:chOff x="3422850" y="2300613"/>
+              <a:chExt cx="1422648" cy="542222"/>
             </a:xfrm>
           </p:grpSpPr>
           <p:sp>
             <p:nvSpPr>
-              <p:cNvPr id="88" name="TextBox 87">
+              <p:cNvPr id="27" name="TextBox 26">
                 <a:extLst>
                   <a:ext uri="{FF2B5EF4-FFF2-40B4-BE49-F238E27FC236}">
-                    <a16:creationId xmlns:a16="http://schemas.microsoft.com/office/drawing/2014/main" id="{43716985-2B6D-4D4E-98EF-91CA5B5885F3}"/>
+                    <a16:creationId xmlns:a16="http://schemas.microsoft.com/office/drawing/2014/main" id="{EDD6AE2F-80EC-1B4E-AE7E-82115C7A9FDE}"/>
                   </a:ext>
                 </a:extLst>
               </p:cNvPr>
@@ -5518,7 +5460,7 @@
             </p:nvSpPr>
             <p:spPr>
               <a:xfrm>
-                <a:off x="3414966" y="2439211"/>
+                <a:off x="3422850" y="2439211"/>
                 <a:ext cx="1422648" cy="403624"/>
               </a:xfrm>
               <a:prstGeom prst="rect">
@@ -5587,10 +5529,10 @@
           </p:sp>
           <p:sp>
             <p:nvSpPr>
-              <p:cNvPr id="90" name="Left Brace 89">
+              <p:cNvPr id="28" name="Left Brace 27">
                 <a:extLst>
                   <a:ext uri="{FF2B5EF4-FFF2-40B4-BE49-F238E27FC236}">
-                    <a16:creationId xmlns:a16="http://schemas.microsoft.com/office/drawing/2014/main" id="{B213CBCF-6C0E-B74F-AF69-6ECE14BE2292}"/>
+                    <a16:creationId xmlns:a16="http://schemas.microsoft.com/office/drawing/2014/main" id="{006661D9-0F1C-6F43-B37B-1C8448F3E45E}"/>
                   </a:ext>
                 </a:extLst>
               </p:cNvPr>
@@ -5599,8 +5541,8 @@
             </p:nvSpPr>
             <p:spPr>
               <a:xfrm rot="16200000">
-                <a:off x="4058176" y="1756266"/>
-                <a:ext cx="134368" cy="1223059"/>
+                <a:off x="4063661" y="1779835"/>
+                <a:ext cx="134368" cy="1175923"/>
               </a:xfrm>
               <a:prstGeom prst="leftBrace">
                 <a:avLst>
@@ -5638,300 +5580,13 @@
             </p:txBody>
           </p:sp>
         </p:grpSp>
-        <p:grpSp>
-          <p:nvGrpSpPr>
-            <p:cNvPr id="150" name="Group 149">
-              <a:extLst>
-                <a:ext uri="{FF2B5EF4-FFF2-40B4-BE49-F238E27FC236}">
-                  <a16:creationId xmlns:a16="http://schemas.microsoft.com/office/drawing/2014/main" id="{6526A935-AE0B-A742-825A-D57EF572CD77}"/>
-                </a:ext>
-              </a:extLst>
-            </p:cNvPr>
-            <p:cNvGrpSpPr/>
-            <p:nvPr/>
-          </p:nvGrpSpPr>
-          <p:grpSpPr>
-            <a:xfrm>
-              <a:off x="2101032" y="2675357"/>
-              <a:ext cx="3076137" cy="102899"/>
-              <a:chOff x="2101032" y="2675357"/>
-              <a:chExt cx="3076137" cy="102899"/>
-            </a:xfrm>
-          </p:grpSpPr>
-          <p:cxnSp>
-            <p:nvCxnSpPr>
-              <p:cNvPr id="121" name="Straight Arrow Connector 120">
-                <a:extLst>
-                  <a:ext uri="{FF2B5EF4-FFF2-40B4-BE49-F238E27FC236}">
-                    <a16:creationId xmlns:a16="http://schemas.microsoft.com/office/drawing/2014/main" id="{ECB0F30B-3B2C-214A-B1A3-77576FF4204E}"/>
-                  </a:ext>
-                </a:extLst>
-              </p:cNvPr>
-              <p:cNvCxnSpPr>
-                <a:cxnSpLocks/>
-              </p:cNvCxnSpPr>
-              <p:nvPr/>
-            </p:nvCxnSpPr>
-            <p:spPr>
-              <a:xfrm>
-                <a:off x="4631048" y="2675358"/>
-                <a:ext cx="546121" cy="0"/>
-              </a:xfrm>
-              <a:prstGeom prst="straightConnector1">
-                <a:avLst/>
-              </a:prstGeom>
-              <a:ln w="12700">
-                <a:solidFill>
-                  <a:srgbClr val="21908D"/>
-                </a:solidFill>
-                <a:headEnd type="none" w="med" len="med"/>
-                <a:tailEnd type="arrow" w="med" len="med"/>
-              </a:ln>
-            </p:spPr>
-            <p:style>
-              <a:lnRef idx="1">
-                <a:schemeClr val="accent1"/>
-              </a:lnRef>
-              <a:fillRef idx="0">
-                <a:schemeClr val="accent1"/>
-              </a:fillRef>
-              <a:effectRef idx="0">
-                <a:schemeClr val="accent1"/>
-              </a:effectRef>
-              <a:fontRef idx="minor">
-                <a:schemeClr val="tx1"/>
-              </a:fontRef>
-            </p:style>
-          </p:cxnSp>
-          <p:cxnSp>
-            <p:nvCxnSpPr>
-              <p:cNvPr id="123" name="Straight Arrow Connector 122">
-                <a:extLst>
-                  <a:ext uri="{FF2B5EF4-FFF2-40B4-BE49-F238E27FC236}">
-                    <a16:creationId xmlns:a16="http://schemas.microsoft.com/office/drawing/2014/main" id="{FCE533A9-FCA0-144D-A5B7-0328E3F1A0D6}"/>
-                  </a:ext>
-                </a:extLst>
-              </p:cNvPr>
-              <p:cNvCxnSpPr>
-                <a:cxnSpLocks/>
-              </p:cNvCxnSpPr>
-              <p:nvPr/>
-            </p:nvCxnSpPr>
-            <p:spPr>
-              <a:xfrm>
-                <a:off x="4771912" y="2778256"/>
-                <a:ext cx="405257" cy="0"/>
-              </a:xfrm>
-              <a:prstGeom prst="straightConnector1">
-                <a:avLst/>
-              </a:prstGeom>
-              <a:ln w="12700">
-                <a:solidFill>
-                  <a:srgbClr val="482576"/>
-                </a:solidFill>
-                <a:headEnd type="none" w="med" len="med"/>
-                <a:tailEnd type="arrow" w="med" len="med"/>
-              </a:ln>
-            </p:spPr>
-            <p:style>
-              <a:lnRef idx="1">
-                <a:schemeClr val="accent1"/>
-              </a:lnRef>
-              <a:fillRef idx="0">
-                <a:schemeClr val="accent1"/>
-              </a:fillRef>
-              <a:effectRef idx="0">
-                <a:schemeClr val="accent1"/>
-              </a:effectRef>
-              <a:fontRef idx="minor">
-                <a:schemeClr val="tx1"/>
-              </a:fontRef>
-            </p:style>
-          </p:cxnSp>
-          <p:cxnSp>
-            <p:nvCxnSpPr>
-              <p:cNvPr id="128" name="Straight Connector 127">
-                <a:extLst>
-                  <a:ext uri="{FF2B5EF4-FFF2-40B4-BE49-F238E27FC236}">
-                    <a16:creationId xmlns:a16="http://schemas.microsoft.com/office/drawing/2014/main" id="{48D3951D-ED83-704E-A0D8-AD3D7ADC6CB4}"/>
-                  </a:ext>
-                </a:extLst>
-              </p:cNvPr>
-              <p:cNvCxnSpPr>
-                <a:cxnSpLocks/>
-              </p:cNvCxnSpPr>
-              <p:nvPr/>
-            </p:nvCxnSpPr>
-            <p:spPr>
-              <a:xfrm flipH="1">
-                <a:off x="3418519" y="2778256"/>
-                <a:ext cx="348016" cy="0"/>
-              </a:xfrm>
-              <a:prstGeom prst="line">
-                <a:avLst/>
-              </a:prstGeom>
-              <a:ln w="12700">
-                <a:solidFill>
-                  <a:srgbClr val="482576"/>
-                </a:solidFill>
-              </a:ln>
-            </p:spPr>
-            <p:style>
-              <a:lnRef idx="1">
-                <a:schemeClr val="accent1"/>
-              </a:lnRef>
-              <a:fillRef idx="0">
-                <a:schemeClr val="accent1"/>
-              </a:fillRef>
-              <a:effectRef idx="0">
-                <a:schemeClr val="accent1"/>
-              </a:effectRef>
-              <a:fontRef idx="minor">
-                <a:schemeClr val="tx1"/>
-              </a:fontRef>
-            </p:style>
-          </p:cxnSp>
-          <p:cxnSp>
-            <p:nvCxnSpPr>
-              <p:cNvPr id="130" name="Straight Connector 129">
-                <a:extLst>
-                  <a:ext uri="{FF2B5EF4-FFF2-40B4-BE49-F238E27FC236}">
-                    <a16:creationId xmlns:a16="http://schemas.microsoft.com/office/drawing/2014/main" id="{5E391885-3B6A-264A-B6B9-2BFAB742C623}"/>
-                  </a:ext>
-                </a:extLst>
-              </p:cNvPr>
-              <p:cNvCxnSpPr>
-                <a:cxnSpLocks/>
-              </p:cNvCxnSpPr>
-              <p:nvPr/>
-            </p:nvCxnSpPr>
-            <p:spPr>
-              <a:xfrm flipH="1">
-                <a:off x="3352231" y="2675357"/>
-                <a:ext cx="555167" cy="0"/>
-              </a:xfrm>
-              <a:prstGeom prst="line">
-                <a:avLst/>
-              </a:prstGeom>
-              <a:ln w="12700">
-                <a:solidFill>
-                  <a:srgbClr val="21908D"/>
-                </a:solidFill>
-              </a:ln>
-            </p:spPr>
-            <p:style>
-              <a:lnRef idx="1">
-                <a:schemeClr val="accent1"/>
-              </a:lnRef>
-              <a:fillRef idx="0">
-                <a:schemeClr val="accent1"/>
-              </a:fillRef>
-              <a:effectRef idx="0">
-                <a:schemeClr val="accent1"/>
-              </a:effectRef>
-              <a:fontRef idx="minor">
-                <a:schemeClr val="tx1"/>
-              </a:fontRef>
-            </p:style>
-          </p:cxnSp>
-          <p:cxnSp>
-            <p:nvCxnSpPr>
-              <p:cNvPr id="132" name="Straight Arrow Connector 131">
-                <a:extLst>
-                  <a:ext uri="{FF2B5EF4-FFF2-40B4-BE49-F238E27FC236}">
-                    <a16:creationId xmlns:a16="http://schemas.microsoft.com/office/drawing/2014/main" id="{4F601AD4-7BC2-BE44-B059-BD9FB7951136}"/>
-                  </a:ext>
-                </a:extLst>
-              </p:cNvPr>
-              <p:cNvCxnSpPr>
-                <a:cxnSpLocks/>
-              </p:cNvCxnSpPr>
-              <p:nvPr/>
-            </p:nvCxnSpPr>
-            <p:spPr>
-              <a:xfrm flipH="1">
-                <a:off x="2101033" y="2675358"/>
-                <a:ext cx="381160" cy="0"/>
-              </a:xfrm>
-              <a:prstGeom prst="straightConnector1">
-                <a:avLst/>
-              </a:prstGeom>
-              <a:ln w="12700">
-                <a:solidFill>
-                  <a:srgbClr val="21908D"/>
-                </a:solidFill>
-                <a:headEnd type="none" w="med" len="med"/>
-                <a:tailEnd type="arrow" w="med" len="med"/>
-              </a:ln>
-            </p:spPr>
-            <p:style>
-              <a:lnRef idx="1">
-                <a:schemeClr val="accent1"/>
-              </a:lnRef>
-              <a:fillRef idx="0">
-                <a:schemeClr val="accent1"/>
-              </a:fillRef>
-              <a:effectRef idx="0">
-                <a:schemeClr val="accent1"/>
-              </a:effectRef>
-              <a:fontRef idx="minor">
-                <a:schemeClr val="tx1"/>
-              </a:fontRef>
-            </p:style>
-          </p:cxnSp>
-          <p:cxnSp>
-            <p:nvCxnSpPr>
-              <p:cNvPr id="134" name="Straight Arrow Connector 133">
-                <a:extLst>
-                  <a:ext uri="{FF2B5EF4-FFF2-40B4-BE49-F238E27FC236}">
-                    <a16:creationId xmlns:a16="http://schemas.microsoft.com/office/drawing/2014/main" id="{97A62107-ECFF-A541-A630-64F53F0AD7F1}"/>
-                  </a:ext>
-                </a:extLst>
-              </p:cNvPr>
-              <p:cNvCxnSpPr>
-                <a:cxnSpLocks/>
-              </p:cNvCxnSpPr>
-              <p:nvPr/>
-            </p:nvCxnSpPr>
-            <p:spPr>
-              <a:xfrm flipH="1">
-                <a:off x="2101032" y="2778256"/>
-                <a:ext cx="314872" cy="0"/>
-              </a:xfrm>
-              <a:prstGeom prst="straightConnector1">
-                <a:avLst/>
-              </a:prstGeom>
-              <a:ln w="12700">
-                <a:solidFill>
-                  <a:srgbClr val="482576"/>
-                </a:solidFill>
-                <a:headEnd type="none" w="med" len="med"/>
-                <a:tailEnd type="arrow" w="med" len="med"/>
-              </a:ln>
-            </p:spPr>
-            <p:style>
-              <a:lnRef idx="1">
-                <a:schemeClr val="accent1"/>
-              </a:lnRef>
-              <a:fillRef idx="0">
-                <a:schemeClr val="accent1"/>
-              </a:fillRef>
-              <a:effectRef idx="0">
-                <a:schemeClr val="accent1"/>
-              </a:effectRef>
-              <a:fontRef idx="minor">
-                <a:schemeClr val="tx1"/>
-              </a:fontRef>
-            </p:style>
-          </p:cxnSp>
-        </p:grpSp>
       </p:grpSp>
       <p:sp>
         <p:nvSpPr>
-          <p:cNvPr id="152" name="TextBox 151">
+          <p:cNvPr id="56" name="TextBox 55">
             <a:extLst>
               <a:ext uri="{FF2B5EF4-FFF2-40B4-BE49-F238E27FC236}">
-                <a16:creationId xmlns:a16="http://schemas.microsoft.com/office/drawing/2014/main" id="{CA8995A2-68D4-0844-9408-C472858661B7}"/>
+                <a16:creationId xmlns:a16="http://schemas.microsoft.com/office/drawing/2014/main" id="{C98BB864-206C-914A-B965-B96C703431D1}"/>
               </a:ext>
             </a:extLst>
           </p:cNvPr>
@@ -5940,7 +5595,7 @@
         </p:nvSpPr>
         <p:spPr>
           <a:xfrm>
-            <a:off x="3013606" y="-61528"/>
+            <a:off x="3013598" y="-40609"/>
             <a:ext cx="1172116" cy="269304"/>
           </a:xfrm>
           <a:prstGeom prst="rect">
@@ -5964,86 +5619,383 @@
           </a:p>
         </p:txBody>
       </p:sp>
-      <p:sp>
-        <p:nvSpPr>
-          <p:cNvPr id="153" name="TextBox 152">
+      <p:grpSp>
+        <p:nvGrpSpPr>
+          <p:cNvPr id="81" name="Group 80">
             <a:extLst>
               <a:ext uri="{FF2B5EF4-FFF2-40B4-BE49-F238E27FC236}">
-                <a16:creationId xmlns:a16="http://schemas.microsoft.com/office/drawing/2014/main" id="{4967F863-6D42-7D4F-85DF-6E613C4FEDA9}"/>
+                <a16:creationId xmlns:a16="http://schemas.microsoft.com/office/drawing/2014/main" id="{F48B13F8-6D7B-6C49-BE32-3BF528C9400D}"/>
               </a:ext>
             </a:extLst>
           </p:cNvPr>
-          <p:cNvSpPr txBox="1"/>
+          <p:cNvGrpSpPr/>
           <p:nvPr/>
-        </p:nvSpPr>
-        <p:spPr>
+        </p:nvGrpSpPr>
+        <p:grpSpPr>
           <a:xfrm>
-            <a:off x="5363189" y="1818543"/>
-            <a:ext cx="1582484" cy="269304"/>
+            <a:off x="1831975" y="3110702"/>
+            <a:ext cx="3536950" cy="121619"/>
+            <a:chOff x="1831975" y="3110702"/>
+            <a:chExt cx="3536950" cy="121619"/>
           </a:xfrm>
-          <a:prstGeom prst="rect">
-            <a:avLst/>
-          </a:prstGeom>
-          <a:noFill/>
-        </p:spPr>
-        <p:txBody>
-          <a:bodyPr wrap="none" rtlCol="0">
-            <a:spAutoFit/>
-          </a:bodyPr>
-          <a:lstStyle/>
-          <a:p>
-            <a:pPr algn="ctr"/>
-            <a:r>
-              <a:rPr lang="en-US" sz="1150" b="1" dirty="0">
-                <a:latin typeface="Helvetica" pitchFamily="2" charset="0"/>
-              </a:rPr>
-              <a:t>Part III: Post-insight</a:t>
-            </a:r>
-          </a:p>
-        </p:txBody>
-      </p:sp>
-      <p:sp>
-        <p:nvSpPr>
-          <p:cNvPr id="154" name="TextBox 153">
+        </p:grpSpPr>
+        <p:cxnSp>
+          <p:nvCxnSpPr>
+            <p:cNvPr id="57" name="Straight Arrow Connector 56">
+              <a:extLst>
+                <a:ext uri="{FF2B5EF4-FFF2-40B4-BE49-F238E27FC236}">
+                  <a16:creationId xmlns:a16="http://schemas.microsoft.com/office/drawing/2014/main" id="{6B9BB587-9A56-9340-AA42-2541B1ADD585}"/>
+                </a:ext>
+              </a:extLst>
+            </p:cNvPr>
+            <p:cNvCxnSpPr>
+              <a:cxnSpLocks/>
+            </p:cNvCxnSpPr>
+            <p:nvPr/>
+          </p:nvCxnSpPr>
+          <p:spPr>
+            <a:xfrm flipH="1">
+              <a:off x="1831975" y="3232321"/>
+              <a:ext cx="423903" cy="0"/>
+            </a:xfrm>
+            <a:prstGeom prst="straightConnector1">
+              <a:avLst/>
+            </a:prstGeom>
+            <a:ln w="12700">
+              <a:solidFill>
+                <a:srgbClr val="482576"/>
+              </a:solidFill>
+              <a:headEnd type="none" w="med" len="med"/>
+              <a:tailEnd type="arrow" w="med" len="med"/>
+            </a:ln>
+          </p:spPr>
+          <p:style>
+            <a:lnRef idx="1">
+              <a:schemeClr val="accent1"/>
+            </a:lnRef>
+            <a:fillRef idx="0">
+              <a:schemeClr val="accent1"/>
+            </a:fillRef>
+            <a:effectRef idx="0">
+              <a:schemeClr val="accent1"/>
+            </a:effectRef>
+            <a:fontRef idx="minor">
+              <a:schemeClr val="tx1"/>
+            </a:fontRef>
+          </p:style>
+        </p:cxnSp>
+        <p:cxnSp>
+          <p:nvCxnSpPr>
+            <p:cNvPr id="59" name="Straight Arrow Connector 58">
+              <a:extLst>
+                <a:ext uri="{FF2B5EF4-FFF2-40B4-BE49-F238E27FC236}">
+                  <a16:creationId xmlns:a16="http://schemas.microsoft.com/office/drawing/2014/main" id="{9CA92784-AC30-7248-A317-5ED91AEAAFD1}"/>
+                </a:ext>
+              </a:extLst>
+            </p:cNvPr>
+            <p:cNvCxnSpPr>
+              <a:cxnSpLocks/>
+            </p:cNvCxnSpPr>
+            <p:nvPr/>
+          </p:nvCxnSpPr>
+          <p:spPr>
+            <a:xfrm flipH="1">
+              <a:off x="1831975" y="3110702"/>
+              <a:ext cx="501651" cy="0"/>
+            </a:xfrm>
+            <a:prstGeom prst="straightConnector1">
+              <a:avLst/>
+            </a:prstGeom>
+            <a:ln w="12700">
+              <a:solidFill>
+                <a:srgbClr val="21908D"/>
+              </a:solidFill>
+              <a:headEnd type="none" w="med" len="med"/>
+              <a:tailEnd type="arrow" w="med" len="med"/>
+            </a:ln>
+          </p:spPr>
+          <p:style>
+            <a:lnRef idx="1">
+              <a:schemeClr val="accent1"/>
+            </a:lnRef>
+            <a:fillRef idx="0">
+              <a:schemeClr val="accent1"/>
+            </a:fillRef>
+            <a:effectRef idx="0">
+              <a:schemeClr val="accent1"/>
+            </a:effectRef>
+            <a:fontRef idx="minor">
+              <a:schemeClr val="tx1"/>
+            </a:fontRef>
+          </p:style>
+        </p:cxnSp>
+        <p:cxnSp>
+          <p:nvCxnSpPr>
+            <p:cNvPr id="65" name="Straight Arrow Connector 64">
+              <a:extLst>
+                <a:ext uri="{FF2B5EF4-FFF2-40B4-BE49-F238E27FC236}">
+                  <a16:creationId xmlns:a16="http://schemas.microsoft.com/office/drawing/2014/main" id="{318E2B87-B880-084D-A1FE-157ED0E079DC}"/>
+                </a:ext>
+              </a:extLst>
+            </p:cNvPr>
+            <p:cNvCxnSpPr>
+              <a:cxnSpLocks/>
+            </p:cNvCxnSpPr>
+            <p:nvPr/>
+          </p:nvCxnSpPr>
+          <p:spPr>
+            <a:xfrm>
+              <a:off x="4800600" y="3110702"/>
+              <a:ext cx="568325" cy="0"/>
+            </a:xfrm>
+            <a:prstGeom prst="straightConnector1">
+              <a:avLst/>
+            </a:prstGeom>
+            <a:ln w="12700">
+              <a:solidFill>
+                <a:srgbClr val="21908D"/>
+              </a:solidFill>
+              <a:headEnd type="none" w="med" len="med"/>
+              <a:tailEnd type="arrow" w="med" len="med"/>
+            </a:ln>
+          </p:spPr>
+          <p:style>
+            <a:lnRef idx="1">
+              <a:schemeClr val="accent1"/>
+            </a:lnRef>
+            <a:fillRef idx="0">
+              <a:schemeClr val="accent1"/>
+            </a:fillRef>
+            <a:effectRef idx="0">
+              <a:schemeClr val="accent1"/>
+            </a:effectRef>
+            <a:fontRef idx="minor">
+              <a:schemeClr val="tx1"/>
+            </a:fontRef>
+          </p:style>
+        </p:cxnSp>
+        <p:cxnSp>
+          <p:nvCxnSpPr>
+            <p:cNvPr id="71" name="Straight Arrow Connector 70">
+              <a:extLst>
+                <a:ext uri="{FF2B5EF4-FFF2-40B4-BE49-F238E27FC236}">
+                  <a16:creationId xmlns:a16="http://schemas.microsoft.com/office/drawing/2014/main" id="{54F3878E-BCC8-674A-A0EA-8F0512FDD315}"/>
+                </a:ext>
+              </a:extLst>
+            </p:cNvPr>
+            <p:cNvCxnSpPr>
+              <a:cxnSpLocks/>
+            </p:cNvCxnSpPr>
+            <p:nvPr/>
+          </p:nvCxnSpPr>
+          <p:spPr>
+            <a:xfrm>
+              <a:off x="4972050" y="3232321"/>
+              <a:ext cx="396875" cy="0"/>
+            </a:xfrm>
+            <a:prstGeom prst="straightConnector1">
+              <a:avLst/>
+            </a:prstGeom>
+            <a:ln w="12700">
+              <a:solidFill>
+                <a:srgbClr val="482576"/>
+              </a:solidFill>
+              <a:headEnd type="none" w="med" len="med"/>
+              <a:tailEnd type="arrow" w="med" len="med"/>
+            </a:ln>
+          </p:spPr>
+          <p:style>
+            <a:lnRef idx="1">
+              <a:schemeClr val="accent1"/>
+            </a:lnRef>
+            <a:fillRef idx="0">
+              <a:schemeClr val="accent1"/>
+            </a:fillRef>
+            <a:effectRef idx="0">
+              <a:schemeClr val="accent1"/>
+            </a:effectRef>
+            <a:fontRef idx="minor">
+              <a:schemeClr val="tx1"/>
+            </a:fontRef>
+          </p:style>
+        </p:cxnSp>
+        <p:cxnSp>
+          <p:nvCxnSpPr>
+            <p:cNvPr id="74" name="Straight Connector 73">
+              <a:extLst>
+                <a:ext uri="{FF2B5EF4-FFF2-40B4-BE49-F238E27FC236}">
+                  <a16:creationId xmlns:a16="http://schemas.microsoft.com/office/drawing/2014/main" id="{B855D902-1776-1742-8966-9B5A58CB2625}"/>
+                </a:ext>
+              </a:extLst>
+            </p:cNvPr>
+            <p:cNvCxnSpPr>
+              <a:cxnSpLocks/>
+            </p:cNvCxnSpPr>
+            <p:nvPr/>
+          </p:nvCxnSpPr>
+          <p:spPr>
+            <a:xfrm flipH="1">
+              <a:off x="3400426" y="3232321"/>
+              <a:ext cx="390036" cy="0"/>
+            </a:xfrm>
+            <a:prstGeom prst="line">
+              <a:avLst/>
+            </a:prstGeom>
+            <a:ln w="12700">
+              <a:solidFill>
+                <a:srgbClr val="482576"/>
+              </a:solidFill>
+            </a:ln>
+          </p:spPr>
+          <p:style>
+            <a:lnRef idx="1">
+              <a:schemeClr val="accent1"/>
+            </a:lnRef>
+            <a:fillRef idx="0">
+              <a:schemeClr val="accent1"/>
+            </a:fillRef>
+            <a:effectRef idx="0">
+              <a:schemeClr val="accent1"/>
+            </a:effectRef>
+            <a:fontRef idx="minor">
+              <a:schemeClr val="tx1"/>
+            </a:fontRef>
+          </p:style>
+        </p:cxnSp>
+        <p:cxnSp>
+          <p:nvCxnSpPr>
+            <p:cNvPr id="77" name="Straight Connector 76">
+              <a:extLst>
+                <a:ext uri="{FF2B5EF4-FFF2-40B4-BE49-F238E27FC236}">
+                  <a16:creationId xmlns:a16="http://schemas.microsoft.com/office/drawing/2014/main" id="{D41CB38D-EEDF-2B4E-8108-12D3F5B23AA0}"/>
+                </a:ext>
+              </a:extLst>
+            </p:cNvPr>
+            <p:cNvCxnSpPr>
+              <a:cxnSpLocks/>
+            </p:cNvCxnSpPr>
+            <p:nvPr/>
+          </p:nvCxnSpPr>
+          <p:spPr>
+            <a:xfrm flipH="1">
+              <a:off x="3327401" y="3110702"/>
+              <a:ext cx="631091" cy="0"/>
+            </a:xfrm>
+            <a:prstGeom prst="line">
+              <a:avLst/>
+            </a:prstGeom>
+            <a:ln w="12700">
+              <a:solidFill>
+                <a:srgbClr val="21908D"/>
+              </a:solidFill>
+            </a:ln>
+          </p:spPr>
+          <p:style>
+            <a:lnRef idx="1">
+              <a:schemeClr val="accent1"/>
+            </a:lnRef>
+            <a:fillRef idx="0">
+              <a:schemeClr val="accent1"/>
+            </a:fillRef>
+            <a:effectRef idx="0">
+              <a:schemeClr val="accent1"/>
+            </a:effectRef>
+            <a:fontRef idx="minor">
+              <a:schemeClr val="tx1"/>
+            </a:fontRef>
+          </p:style>
+        </p:cxnSp>
+      </p:grpSp>
+      <p:cxnSp>
+        <p:nvCxnSpPr>
+          <p:cNvPr id="66" name="Straight Connector 65">
             <a:extLst>
               <a:ext uri="{FF2B5EF4-FFF2-40B4-BE49-F238E27FC236}">
-                <a16:creationId xmlns:a16="http://schemas.microsoft.com/office/drawing/2014/main" id="{DDF7E148-6F50-CB46-BC7F-714ECD3A0C20}"/>
+                <a16:creationId xmlns:a16="http://schemas.microsoft.com/office/drawing/2014/main" id="{7ED4E2C9-ED76-7942-8C74-4CA0E48AFD18}"/>
               </a:ext>
             </a:extLst>
           </p:cNvPr>
-          <p:cNvSpPr txBox="1"/>
+          <p:cNvCxnSpPr>
+            <a:cxnSpLocks/>
+          </p:cNvCxnSpPr>
           <p:nvPr/>
-        </p:nvSpPr>
+        </p:nvCxnSpPr>
         <p:spPr>
-          <a:xfrm>
-            <a:off x="416938" y="1815895"/>
-            <a:ext cx="1417375" cy="269304"/>
+          <a:xfrm flipV="1">
+            <a:off x="3607346" y="2134088"/>
+            <a:ext cx="0" cy="136800"/>
           </a:xfrm>
-          <a:prstGeom prst="rect">
+          <a:prstGeom prst="line">
             <a:avLst/>
           </a:prstGeom>
-          <a:noFill/>
+          <a:ln w="12700">
+            <a:solidFill>
+              <a:schemeClr val="tx1"/>
+            </a:solidFill>
+          </a:ln>
         </p:spPr>
-        <p:txBody>
-          <a:bodyPr wrap="none" rtlCol="0">
-            <a:spAutoFit/>
-          </a:bodyPr>
-          <a:lstStyle/>
-          <a:p>
-            <a:pPr algn="ctr"/>
-            <a:r>
-              <a:rPr lang="en-US" sz="1150" b="1" dirty="0">
-                <a:latin typeface="Helvetica" pitchFamily="2" charset="0"/>
-              </a:rPr>
-              <a:t>Part I: Pre-insight</a:t>
-            </a:r>
-          </a:p>
-        </p:txBody>
-      </p:sp>
+        <p:style>
+          <a:lnRef idx="1">
+            <a:schemeClr val="accent1"/>
+          </a:lnRef>
+          <a:fillRef idx="0">
+            <a:schemeClr val="accent1"/>
+          </a:fillRef>
+          <a:effectRef idx="0">
+            <a:schemeClr val="accent1"/>
+          </a:effectRef>
+          <a:fontRef idx="minor">
+            <a:schemeClr val="tx1"/>
+          </a:fontRef>
+        </p:style>
+      </p:cxnSp>
+      <p:cxnSp>
+        <p:nvCxnSpPr>
+          <p:cNvPr id="68" name="Straight Connector 67">
+            <a:extLst>
+              <a:ext uri="{FF2B5EF4-FFF2-40B4-BE49-F238E27FC236}">
+                <a16:creationId xmlns:a16="http://schemas.microsoft.com/office/drawing/2014/main" id="{79A828B9-ADEE-4048-9819-565790F1CB04}"/>
+              </a:ext>
+            </a:extLst>
+          </p:cNvPr>
+          <p:cNvCxnSpPr>
+            <a:cxnSpLocks/>
+          </p:cNvCxnSpPr>
+          <p:nvPr/>
+        </p:nvCxnSpPr>
+        <p:spPr>
+          <a:xfrm flipV="1">
+            <a:off x="4521053" y="1998701"/>
+            <a:ext cx="0" cy="136800"/>
+          </a:xfrm>
+          <a:prstGeom prst="line">
+            <a:avLst/>
+          </a:prstGeom>
+          <a:ln w="12700">
+            <a:solidFill>
+              <a:schemeClr val="tx1"/>
+            </a:solidFill>
+          </a:ln>
+        </p:spPr>
+        <p:style>
+          <a:lnRef idx="1">
+            <a:schemeClr val="accent1"/>
+          </a:lnRef>
+          <a:fillRef idx="0">
+            <a:schemeClr val="accent1"/>
+          </a:fillRef>
+          <a:effectRef idx="0">
+            <a:schemeClr val="accent1"/>
+          </a:effectRef>
+          <a:fontRef idx="minor">
+            <a:schemeClr val="tx1"/>
+          </a:fontRef>
+        </p:style>
+      </p:cxnSp>
     </p:spTree>
     <p:extLst>
       <p:ext uri="{BB962C8B-B14F-4D97-AF65-F5344CB8AC3E}">
-        <p14:creationId xmlns:p14="http://schemas.microsoft.com/office/powerpoint/2010/main" val="1962121369"/>
+        <p14:creationId xmlns:p14="http://schemas.microsoft.com/office/powerpoint/2010/main" val="2197870950"/>
       </p:ext>
     </p:extLst>
   </p:cSld>

</xml_diff>

<commit_message>
rename N1 to N170
</commit_message>
<xml_diff>
--- a/analysis/manuscript_files/figure-1a.pptx
+++ b/analysis/manuscript_files/figure-1a.pptx
@@ -197,7 +197,7 @@
           <a:p>
             <a:fld id="{6FE0F7CC-7061-5049-9DDB-E208C13D259A}" type="datetimeFigureOut">
               <a:rPr lang="en-US" smtClean="0"/>
-              <a:t>10/16/20</a:t>
+              <a:t>10/20/20</a:t>
             </a:fld>
             <a:endParaRPr lang="en-US"/>
           </a:p>
@@ -680,7 +680,7 @@
           <a:p>
             <a:fld id="{1C407B86-2FEA-814D-8159-D22E2797FD65}" type="datetimeFigureOut">
               <a:rPr lang="en-US" smtClean="0"/>
-              <a:t>10/16/20</a:t>
+              <a:t>10/20/20</a:t>
             </a:fld>
             <a:endParaRPr lang="en-US"/>
           </a:p>
@@ -850,7 +850,7 @@
           <a:p>
             <a:fld id="{1C407B86-2FEA-814D-8159-D22E2797FD65}" type="datetimeFigureOut">
               <a:rPr lang="en-US" smtClean="0"/>
-              <a:t>10/16/20</a:t>
+              <a:t>10/20/20</a:t>
             </a:fld>
             <a:endParaRPr lang="en-US"/>
           </a:p>
@@ -1030,7 +1030,7 @@
           <a:p>
             <a:fld id="{1C407B86-2FEA-814D-8159-D22E2797FD65}" type="datetimeFigureOut">
               <a:rPr lang="en-US" smtClean="0"/>
-              <a:t>10/16/20</a:t>
+              <a:t>10/20/20</a:t>
             </a:fld>
             <a:endParaRPr lang="en-US"/>
           </a:p>
@@ -1200,7 +1200,7 @@
           <a:p>
             <a:fld id="{1C407B86-2FEA-814D-8159-D22E2797FD65}" type="datetimeFigureOut">
               <a:rPr lang="en-US" smtClean="0"/>
-              <a:t>10/16/20</a:t>
+              <a:t>10/20/20</a:t>
             </a:fld>
             <a:endParaRPr lang="en-US"/>
           </a:p>
@@ -1446,7 +1446,7 @@
           <a:p>
             <a:fld id="{1C407B86-2FEA-814D-8159-D22E2797FD65}" type="datetimeFigureOut">
               <a:rPr lang="en-US" smtClean="0"/>
-              <a:t>10/16/20</a:t>
+              <a:t>10/20/20</a:t>
             </a:fld>
             <a:endParaRPr lang="en-US"/>
           </a:p>
@@ -1678,7 +1678,7 @@
           <a:p>
             <a:fld id="{1C407B86-2FEA-814D-8159-D22E2797FD65}" type="datetimeFigureOut">
               <a:rPr lang="en-US" smtClean="0"/>
-              <a:t>10/16/20</a:t>
+              <a:t>10/20/20</a:t>
             </a:fld>
             <a:endParaRPr lang="en-US"/>
           </a:p>
@@ -2045,7 +2045,7 @@
           <a:p>
             <a:fld id="{1C407B86-2FEA-814D-8159-D22E2797FD65}" type="datetimeFigureOut">
               <a:rPr lang="en-US" smtClean="0"/>
-              <a:t>10/16/20</a:t>
+              <a:t>10/20/20</a:t>
             </a:fld>
             <a:endParaRPr lang="en-US"/>
           </a:p>
@@ -2163,7 +2163,7 @@
           <a:p>
             <a:fld id="{1C407B86-2FEA-814D-8159-D22E2797FD65}" type="datetimeFigureOut">
               <a:rPr lang="en-US" smtClean="0"/>
-              <a:t>10/16/20</a:t>
+              <a:t>10/20/20</a:t>
             </a:fld>
             <a:endParaRPr lang="en-US"/>
           </a:p>
@@ -2258,7 +2258,7 @@
           <a:p>
             <a:fld id="{1C407B86-2FEA-814D-8159-D22E2797FD65}" type="datetimeFigureOut">
               <a:rPr lang="en-US" smtClean="0"/>
-              <a:t>10/16/20</a:t>
+              <a:t>10/20/20</a:t>
             </a:fld>
             <a:endParaRPr lang="en-US"/>
           </a:p>
@@ -2535,7 +2535,7 @@
           <a:p>
             <a:fld id="{1C407B86-2FEA-814D-8159-D22E2797FD65}" type="datetimeFigureOut">
               <a:rPr lang="en-US" smtClean="0"/>
-              <a:t>10/16/20</a:t>
+              <a:t>10/20/20</a:t>
             </a:fld>
             <a:endParaRPr lang="en-US"/>
           </a:p>
@@ -2792,7 +2792,7 @@
           <a:p>
             <a:fld id="{1C407B86-2FEA-814D-8159-D22E2797FD65}" type="datetimeFigureOut">
               <a:rPr lang="en-US" smtClean="0"/>
-              <a:t>10/16/20</a:t>
+              <a:t>10/20/20</a:t>
             </a:fld>
             <a:endParaRPr lang="en-US"/>
           </a:p>
@@ -3005,7 +3005,7 @@
           <a:p>
             <a:fld id="{1C407B86-2FEA-814D-8159-D22E2797FD65}" type="datetimeFigureOut">
               <a:rPr lang="en-US" smtClean="0"/>
-              <a:t>10/16/20</a:t>
+              <a:t>10/20/20</a:t>
             </a:fld>
             <a:endParaRPr lang="en-US"/>
           </a:p>
@@ -3722,8 +3722,8 @@
         </p:nvSpPr>
         <p:spPr>
           <a:xfrm>
-            <a:off x="366703" y="1906646"/>
-            <a:ext cx="1417375" cy="269304"/>
+            <a:off x="345864" y="1906646"/>
+            <a:ext cx="1459054" cy="269304"/>
           </a:xfrm>
           <a:prstGeom prst="rect">
             <a:avLst/>
@@ -3741,7 +3741,7 @@
               <a:rPr lang="en-US" sz="1150" b="1" dirty="0">
                 <a:latin typeface="Helvetica" pitchFamily="2" charset="0"/>
               </a:rPr>
-              <a:t>Part I: Pre-insight</a:t>
+              <a:t>Part I (pre-insight)</a:t>
             </a:r>
           </a:p>
         </p:txBody>
@@ -4058,8 +4058,8 @@
         </p:nvSpPr>
         <p:spPr>
           <a:xfrm>
-            <a:off x="5427235" y="1903646"/>
-            <a:ext cx="1582484" cy="269304"/>
+            <a:off x="5406396" y="1903646"/>
+            <a:ext cx="1624164" cy="269304"/>
           </a:xfrm>
           <a:prstGeom prst="rect">
             <a:avLst/>
@@ -4077,7 +4077,7 @@
               <a:rPr lang="en-US" sz="1150" b="1" dirty="0">
                 <a:latin typeface="Helvetica" pitchFamily="2" charset="0"/>
               </a:rPr>
-              <a:t>Part III: Post-insight</a:t>
+              <a:t>Part III (post-insight)</a:t>
             </a:r>
           </a:p>
         </p:txBody>
@@ -5595,8 +5595,8 @@
         </p:nvSpPr>
         <p:spPr>
           <a:xfrm>
-            <a:off x="3013598" y="-40609"/>
-            <a:ext cx="1172116" cy="269304"/>
+            <a:off x="2988752" y="-40609"/>
+            <a:ext cx="1221809" cy="269304"/>
           </a:xfrm>
           <a:prstGeom prst="rect">
             <a:avLst/>
@@ -5614,7 +5614,7 @@
               <a:rPr lang="en-US" sz="1150" b="1" dirty="0">
                 <a:latin typeface="Helvetica" pitchFamily="2" charset="0"/>
               </a:rPr>
-              <a:t>Part II: Insight</a:t>
+              <a:t>Part II (insight)</a:t>
             </a:r>
           </a:p>
         </p:txBody>

</xml_diff>